<commit_message>
Updated the slides with new logos/links
</commit_message>
<xml_diff>
--- a/slides/AzureASPNET.pptx
+++ b/slides/AzureASPNET.pptx
@@ -282,7 +282,7 @@
               <a:pPr>
                 <a:defRPr/>
               </a:pPr>
-              <a:t>10/31/2017 6:10 AM</a:t>
+              <a:t>10/31/2017 1:42 PM</a:t>
             </a:fld>
             <a:endParaRPr lang="en-US"/>
           </a:p>
@@ -497,7 +497,7 @@
               <a:pPr>
                 <a:defRPr/>
               </a:pPr>
-              <a:t>10/31/2017 6:10 AM</a:t>
+              <a:t>10/31/2017 1:42 PM</a:t>
             </a:fld>
             <a:endParaRPr lang="en-US"/>
           </a:p>
@@ -902,7 +902,7 @@
             <a:fld id="{645EDAD1-88E4-4536-AD95-0BFD82EC77E6}" type="datetime8">
               <a:rPr lang="en-US" smtClean="0"/>
               <a:pPr/>
-              <a:t>10/31/2017 6:10 AM</a:t>
+              <a:t>10/31/2017 1:42 PM</a:t>
             </a:fld>
             <a:endParaRPr lang="en-US"/>
           </a:p>
@@ -7078,8 +7078,8 @@
         </p:nvSpPr>
         <p:spPr>
           <a:xfrm>
-            <a:off x="639734" y="3886200"/>
-            <a:ext cx="7887493" cy="523220"/>
+            <a:off x="783402" y="3886200"/>
+            <a:ext cx="7600159" cy="510909"/>
           </a:xfrm>
           <a:prstGeom prst="rect">
             <a:avLst/>
@@ -7093,35 +7093,86 @@
           <a:lstStyle/>
           <a:p>
             <a:r>
-              <a:rPr lang="en-US" sz="3200" dirty="0">
+              <a:rPr lang="en-US" sz="3200" b="1" dirty="0">
                 <a:latin typeface="+mn-lt"/>
               </a:rPr>
-              <a:t>https://</a:t>
-            </a:r>
-            <a:r>
-              <a:rPr lang="en-US" sz="3200" dirty="0" err="1">
-                <a:latin typeface="+mn-lt"/>
-              </a:rPr>
-              <a:t>github.com</a:t>
-            </a:r>
-            <a:r>
-              <a:rPr lang="en-US" sz="3200" dirty="0">
-                <a:latin typeface="+mn-lt"/>
-              </a:rPr>
-              <a:t>/lozanotek/</a:t>
-            </a:r>
-            <a:r>
-              <a:rPr lang="en-US" sz="3200" dirty="0" err="1">
-                <a:latin typeface="+mn-lt"/>
-              </a:rPr>
-              <a:t>AzureASPNET</a:t>
-            </a:r>
-            <a:endParaRPr lang="en-US" sz="3200" dirty="0">
-              <a:latin typeface="+mn-lt"/>
-            </a:endParaRPr>
-          </a:p>
-        </p:txBody>
-      </p:sp>
+              <a:t>https://github.com/lozanotek/azure-aspnet</a:t>
+            </a:r>
+          </a:p>
+        </p:txBody>
+      </p:sp>
+      <p:pic>
+        <p:nvPicPr>
+          <p:cNvPr id="8" name="Picture 7">
+            <a:extLst>
+              <a:ext uri="{FF2B5EF4-FFF2-40B4-BE49-F238E27FC236}">
+                <a16:creationId xmlns:a16="http://schemas.microsoft.com/office/drawing/2014/main" id="{6E713826-64F7-482D-957C-84159CD68369}"/>
+              </a:ext>
+            </a:extLst>
+          </p:cNvPr>
+          <p:cNvPicPr>
+            <a:picLocks noChangeAspect="1"/>
+          </p:cNvPicPr>
+          <p:nvPr/>
+        </p:nvPicPr>
+        <p:blipFill>
+          <a:blip r:embed="rId4" cstate="print">
+            <a:extLst>
+              <a:ext uri="{28A0092B-C50C-407E-A947-70E740481C1C}">
+                <a14:useLocalDpi xmlns:a14="http://schemas.microsoft.com/office/drawing/2010/main" val="0"/>
+              </a:ext>
+            </a:extLst>
+          </a:blip>
+          <a:stretch>
+            <a:fillRect/>
+          </a:stretch>
+        </p:blipFill>
+        <p:spPr>
+          <a:xfrm>
+            <a:off x="7402831" y="2301253"/>
+            <a:ext cx="1360169" cy="1223173"/>
+          </a:xfrm>
+          <a:prstGeom prst="rect">
+            <a:avLst/>
+          </a:prstGeom>
+        </p:spPr>
+      </p:pic>
+      <p:pic>
+        <p:nvPicPr>
+          <p:cNvPr id="10" name="Picture 9">
+            <a:extLst>
+              <a:ext uri="{FF2B5EF4-FFF2-40B4-BE49-F238E27FC236}">
+                <a16:creationId xmlns:a16="http://schemas.microsoft.com/office/drawing/2014/main" id="{9B34F7DA-6620-4B8A-8FE4-F68388B220EE}"/>
+              </a:ext>
+            </a:extLst>
+          </p:cNvPr>
+          <p:cNvPicPr>
+            <a:picLocks noChangeAspect="1"/>
+          </p:cNvPicPr>
+          <p:nvPr/>
+        </p:nvPicPr>
+        <p:blipFill>
+          <a:blip r:embed="rId5" cstate="print">
+            <a:extLst>
+              <a:ext uri="{28A0092B-C50C-407E-A947-70E740481C1C}">
+                <a14:useLocalDpi xmlns:a14="http://schemas.microsoft.com/office/drawing/2010/main" val="0"/>
+              </a:ext>
+            </a:extLst>
+          </a:blip>
+          <a:stretch>
+            <a:fillRect/>
+          </a:stretch>
+        </p:blipFill>
+        <p:spPr>
+          <a:xfrm>
+            <a:off x="5985117" y="2402753"/>
+            <a:ext cx="1294207" cy="1161680"/>
+          </a:xfrm>
+          <a:prstGeom prst="rect">
+            <a:avLst/>
+          </a:prstGeom>
+        </p:spPr>
+      </p:pic>
     </p:spTree>
     <p:extLst>
       <p:ext uri="{BB962C8B-B14F-4D97-AF65-F5344CB8AC3E}">

</xml_diff>